<commit_message>
trim down slides for time
</commit_message>
<xml_diff>
--- a/lessons/class3/Class3A_Freq_Assocs.pptx
+++ b/lessons/class3/Class3A_Freq_Assocs.pptx
@@ -6426,7 +6426,7 @@
           <a:p>
             <a:fld id="{B0C0A60C-850A-4EA4-9C14-A8FE98B94505}" type="datetimeFigureOut">
               <a:rPr lang="en-US" smtClean="0"/>
-              <a:t>1/10/21</a:t>
+              <a:t>2/25/21</a:t>
             </a:fld>
             <a:endParaRPr lang="en-US"/>
           </a:p>
@@ -6825,7 +6825,7 @@
           <a:p>
             <a:fld id="{5738B90E-0779-4C36-915C-6F05FCD89456}" type="datetime1">
               <a:rPr lang="en-US" smtClean="0"/>
-              <a:t>1/10/21</a:t>
+              <a:t>2/25/21</a:t>
             </a:fld>
             <a:endParaRPr lang="en-US"/>
           </a:p>
@@ -7022,7 +7022,7 @@
           <a:p>
             <a:fld id="{7B9EA29D-D431-42FE-B7B6-AAE4454C77D3}" type="datetime1">
               <a:rPr lang="en-US" smtClean="0"/>
-              <a:t>1/10/21</a:t>
+              <a:t>2/25/21</a:t>
             </a:fld>
             <a:endParaRPr lang="en-US"/>
           </a:p>
@@ -7377,7 +7377,7 @@
           <a:p>
             <a:fld id="{690D8A1E-EA8F-46C1-B891-AE0C00D9C314}" type="datetime1">
               <a:rPr lang="en-US" smtClean="0"/>
-              <a:t>1/10/21</a:t>
+              <a:t>2/25/21</a:t>
             </a:fld>
             <a:endParaRPr lang="en-US"/>
           </a:p>
@@ -7685,7 +7685,7 @@
           <a:p>
             <a:fld id="{D753EFC8-4232-4598-94F6-94C0EBAFC469}" type="datetime1">
               <a:rPr lang="en-US" smtClean="0"/>
-              <a:t>1/10/21</a:t>
+              <a:t>2/25/21</a:t>
             </a:fld>
             <a:endParaRPr lang="en-US"/>
           </a:p>
@@ -8014,7 +8014,7 @@
           <a:p>
             <a:fld id="{F3161074-1C18-4AE7-957D-F18524378C85}" type="datetime1">
               <a:rPr lang="en-US" smtClean="0"/>
-              <a:t>1/10/21</a:t>
+              <a:t>2/25/21</a:t>
             </a:fld>
             <a:endParaRPr lang="en-US"/>
           </a:p>
@@ -8267,7 +8267,7 @@
           <a:p>
             <a:fld id="{69BE256C-8D9A-4404-B47D-41A1AE514425}" type="datetime1">
               <a:rPr lang="en-US" smtClean="0"/>
-              <a:t>1/10/21</a:t>
+              <a:t>2/25/21</a:t>
             </a:fld>
             <a:endParaRPr lang="en-US"/>
           </a:p>
@@ -8715,7 +8715,7 @@
           <a:p>
             <a:fld id="{66CB2154-9035-4012-8189-BAAB61C5A5EE}" type="datetime1">
               <a:rPr lang="en-US" smtClean="0"/>
-              <a:t>1/10/21</a:t>
+              <a:t>2/25/21</a:t>
             </a:fld>
             <a:endParaRPr lang="en-US"/>
           </a:p>
@@ -8903,7 +8903,7 @@
           <a:p>
             <a:fld id="{6700A58B-DD98-43D0-B791-721480A02982}" type="datetime1">
               <a:rPr lang="en-US" smtClean="0"/>
-              <a:t>1/10/21</a:t>
+              <a:t>2/25/21</a:t>
             </a:fld>
             <a:endParaRPr lang="en-US"/>
           </a:p>
@@ -9109,7 +9109,7 @@
           <a:p>
             <a:fld id="{7DB6E382-4F61-4E24-BE1A-377EC83D0E3A}" type="datetime1">
               <a:rPr lang="en-US" smtClean="0"/>
-              <a:t>1/10/21</a:t>
+              <a:t>2/25/21</a:t>
             </a:fld>
             <a:endParaRPr lang="en-US"/>
           </a:p>
@@ -9515,7 +9515,7 @@
           <a:p>
             <a:fld id="{4142EED6-FC16-45B9-B8C4-2BC5DBA88325}" type="datetime1">
               <a:rPr lang="en-US" smtClean="0"/>
-              <a:t>1/10/21</a:t>
+              <a:t>2/25/21</a:t>
             </a:fld>
             <a:endParaRPr lang="en-US"/>
           </a:p>
@@ -9847,7 +9847,7 @@
           <a:p>
             <a:fld id="{DF59512B-4F1D-43D7-8819-2F53FEF69650}" type="datetime1">
               <a:rPr lang="en-US" smtClean="0"/>
-              <a:t>1/10/21</a:t>
+              <a:t>2/25/21</a:t>
             </a:fld>
             <a:endParaRPr lang="en-US"/>
           </a:p>
@@ -10137,7 +10137,7 @@
           <a:p>
             <a:fld id="{08437B94-E2BF-44DC-ADC5-B05FC9934E9D}" type="datetime1">
               <a:rPr lang="en-US" smtClean="0"/>
-              <a:t>1/10/21</a:t>
+              <a:t>2/25/21</a:t>
             </a:fld>
             <a:endParaRPr lang="en-US"/>
           </a:p>
@@ -10576,7 +10576,7 @@
           <a:p>
             <a:fld id="{6700A58B-DD98-43D0-B791-721480A02982}" type="datetime1">
               <a:rPr lang="en-US" smtClean="0"/>
-              <a:t>1/10/21</a:t>
+              <a:t>2/25/21</a:t>
             </a:fld>
             <a:endParaRPr lang="en-US"/>
           </a:p>
@@ -10766,7 +10766,7 @@
           <a:p>
             <a:fld id="{6700A58B-DD98-43D0-B791-721480A02982}" type="datetime1">
               <a:rPr lang="en-US" smtClean="0"/>
-              <a:t>1/10/21</a:t>
+              <a:t>2/25/21</a:t>
             </a:fld>
             <a:endParaRPr lang="en-US"/>
           </a:p>
@@ -11205,7 +11205,7 @@
           <a:p>
             <a:fld id="{6700A58B-DD98-43D0-B791-721480A02982}" type="datetime1">
               <a:rPr lang="en-US" smtClean="0"/>
-              <a:t>1/10/21</a:t>
+              <a:t>2/25/21</a:t>
             </a:fld>
             <a:endParaRPr lang="en-US"/>
           </a:p>
@@ -11705,7 +11705,7 @@
           <a:p>
             <a:fld id="{6700A58B-DD98-43D0-B791-721480A02982}" type="datetime1">
               <a:rPr lang="en-US" smtClean="0"/>
-              <a:t>1/10/21</a:t>
+              <a:t>2/25/21</a:t>
             </a:fld>
             <a:endParaRPr lang="en-US"/>
           </a:p>
@@ -12268,7 +12268,7 @@
           <a:p>
             <a:fld id="{6700A58B-DD98-43D0-B791-721480A02982}" type="datetime1">
               <a:rPr lang="en-US" smtClean="0"/>
-              <a:t>1/10/21</a:t>
+              <a:t>2/25/21</a:t>
             </a:fld>
             <a:endParaRPr lang="en-US"/>
           </a:p>
@@ -12711,7 +12711,7 @@
           <a:p>
             <a:fld id="{6700A58B-DD98-43D0-B791-721480A02982}" type="datetime1">
               <a:rPr lang="en-US" smtClean="0"/>
-              <a:t>1/10/21</a:t>
+              <a:t>2/25/21</a:t>
             </a:fld>
             <a:endParaRPr lang="en-US"/>
           </a:p>
@@ -13331,7 +13331,7 @@
           <a:p>
             <a:fld id="{6700A58B-DD98-43D0-B791-721480A02982}" type="datetime1">
               <a:rPr lang="en-US" smtClean="0"/>
-              <a:t>1/10/21</a:t>
+              <a:t>2/25/21</a:t>
             </a:fld>
             <a:endParaRPr lang="en-US"/>
           </a:p>
@@ -14261,7 +14261,7 @@
           <a:p>
             <a:fld id="{6700A58B-DD98-43D0-B791-721480A02982}" type="datetime1">
               <a:rPr lang="en-US" smtClean="0"/>
-              <a:t>1/10/21</a:t>
+              <a:t>2/25/21</a:t>
             </a:fld>
             <a:endParaRPr lang="en-US"/>
           </a:p>
@@ -14770,7 +14770,7 @@
             <a:fld id="{6700A58B-DD98-43D0-B791-721480A02982}" type="datetime1">
               <a:rPr lang="en-US" smtClean="0"/>
               <a:pPr/>
-              <a:t>1/10/21</a:t>
+              <a:t>2/25/21</a:t>
             </a:fld>
             <a:endParaRPr lang="en-US"/>
           </a:p>
@@ -15235,7 +15235,7 @@
           <a:p>
             <a:fld id="{6700A58B-DD98-43D0-B791-721480A02982}" type="datetime1">
               <a:rPr lang="en-US" smtClean="0"/>
-              <a:t>1/10/21</a:t>
+              <a:t>2/25/21</a:t>
             </a:fld>
             <a:endParaRPr lang="en-US"/>
           </a:p>
@@ -17179,7 +17179,7 @@
           <a:p>
             <a:fld id="{6700A58B-DD98-43D0-B791-721480A02982}" type="datetime1">
               <a:rPr lang="en-US" smtClean="0"/>
-              <a:t>1/10/21</a:t>
+              <a:t>2/25/21</a:t>
             </a:fld>
             <a:endParaRPr lang="en-US"/>
           </a:p>
@@ -17428,7 +17428,7 @@
 </file>
 
 <file path=ppt/slides/slide4.xml><?xml version="1.0" encoding="utf-8"?>
-<p:sld xmlns:a="http://schemas.openxmlformats.org/drawingml/2006/main" xmlns:r="http://schemas.openxmlformats.org/officeDocument/2006/relationships" xmlns:p="http://schemas.openxmlformats.org/presentationml/2006/main">
+<p:sld xmlns:a="http://schemas.openxmlformats.org/drawingml/2006/main" xmlns:r="http://schemas.openxmlformats.org/officeDocument/2006/relationships" xmlns:p="http://schemas.openxmlformats.org/presentationml/2006/main" show="0">
   <p:cSld>
     <p:spTree>
       <p:nvGrpSpPr>
@@ -17467,7 +17467,7 @@
           <a:p>
             <a:fld id="{6700A58B-DD98-43D0-B791-721480A02982}" type="datetime1">
               <a:rPr lang="en-US" smtClean="0"/>
-              <a:t>1/10/21</a:t>
+              <a:t>2/25/21</a:t>
             </a:fld>
             <a:endParaRPr lang="en-US"/>
           </a:p>
@@ -18159,7 +18159,7 @@
 </file>
 
 <file path=ppt/slides/slide5.xml><?xml version="1.0" encoding="utf-8"?>
-<p:sld xmlns:a="http://schemas.openxmlformats.org/drawingml/2006/main" xmlns:r="http://schemas.openxmlformats.org/officeDocument/2006/relationships" xmlns:p="http://schemas.openxmlformats.org/presentationml/2006/main">
+<p:sld xmlns:a="http://schemas.openxmlformats.org/drawingml/2006/main" xmlns:r="http://schemas.openxmlformats.org/officeDocument/2006/relationships" xmlns:p="http://schemas.openxmlformats.org/presentationml/2006/main" show="0">
   <p:cSld>
     <p:spTree>
       <p:nvGrpSpPr>
@@ -18198,7 +18198,7 @@
           <a:p>
             <a:fld id="{6700A58B-DD98-43D0-B791-721480A02982}" type="datetime1">
               <a:rPr lang="en-US" smtClean="0"/>
-              <a:t>1/10/21</a:t>
+              <a:t>2/25/21</a:t>
             </a:fld>
             <a:endParaRPr lang="en-US"/>
           </a:p>
@@ -18489,7 +18489,7 @@
 </file>
 
 <file path=ppt/slides/slide6.xml><?xml version="1.0" encoding="utf-8"?>
-<p:sld xmlns:a="http://schemas.openxmlformats.org/drawingml/2006/main" xmlns:r="http://schemas.openxmlformats.org/officeDocument/2006/relationships" xmlns:p="http://schemas.openxmlformats.org/presentationml/2006/main">
+<p:sld xmlns:a="http://schemas.openxmlformats.org/drawingml/2006/main" xmlns:r="http://schemas.openxmlformats.org/officeDocument/2006/relationships" xmlns:p="http://schemas.openxmlformats.org/presentationml/2006/main" show="0">
   <p:cSld>
     <p:spTree>
       <p:nvGrpSpPr>
@@ -18528,7 +18528,7 @@
           <a:p>
             <a:fld id="{6700A58B-DD98-43D0-B791-721480A02982}" type="datetime1">
               <a:rPr lang="en-US" smtClean="0"/>
-              <a:t>1/10/21</a:t>
+              <a:t>2/25/21</a:t>
             </a:fld>
             <a:endParaRPr lang="en-US"/>
           </a:p>
@@ -18835,7 +18835,7 @@
 </file>
 
 <file path=ppt/slides/slide7.xml><?xml version="1.0" encoding="utf-8"?>
-<p:sld xmlns:a="http://schemas.openxmlformats.org/drawingml/2006/main" xmlns:r="http://schemas.openxmlformats.org/officeDocument/2006/relationships" xmlns:p="http://schemas.openxmlformats.org/presentationml/2006/main">
+<p:sld xmlns:a="http://schemas.openxmlformats.org/drawingml/2006/main" xmlns:r="http://schemas.openxmlformats.org/officeDocument/2006/relationships" xmlns:p="http://schemas.openxmlformats.org/presentationml/2006/main" show="0">
   <p:cSld>
     <p:spTree>
       <p:nvGrpSpPr>
@@ -18868,7 +18868,7 @@
           <a:p>
             <a:fld id="{6700A58B-DD98-43D0-B791-721480A02982}" type="datetime1">
               <a:rPr lang="en-US" smtClean="0"/>
-              <a:t>1/10/21</a:t>
+              <a:t>2/25/21</a:t>
             </a:fld>
             <a:endParaRPr lang="en-US"/>
           </a:p>
@@ -19197,7 +19197,7 @@
           <a:p>
             <a:fld id="{6700A58B-DD98-43D0-B791-721480A02982}" type="datetime1">
               <a:rPr lang="en-US" smtClean="0"/>
-              <a:t>1/10/21</a:t>
+              <a:t>2/25/21</a:t>
             </a:fld>
             <a:endParaRPr lang="en-US"/>
           </a:p>
@@ -19568,7 +19568,7 @@
           <a:p>
             <a:fld id="{6700A58B-DD98-43D0-B791-721480A02982}" type="datetime1">
               <a:rPr lang="en-US" smtClean="0"/>
-              <a:t>1/10/21</a:t>
+              <a:t>2/25/21</a:t>
             </a:fld>
             <a:endParaRPr lang="en-US"/>
           </a:p>

</xml_diff>